<commit_message>
Doku eta Power point
</commit_message>
<xml_diff>
--- a/Brain Pain powerpoint.pptx
+++ b/Brain Pain powerpoint.pptx
@@ -6,16 +6,15 @@
   </p:sldMasterIdLst>
   <p:sldIdLst>
     <p:sldId id="256" r:id="rId2"/>
-    <p:sldId id="257" r:id="rId3"/>
-    <p:sldId id="258" r:id="rId4"/>
-    <p:sldId id="259" r:id="rId5"/>
-    <p:sldId id="260" r:id="rId6"/>
-    <p:sldId id="261" r:id="rId7"/>
-    <p:sldId id="265" r:id="rId8"/>
-    <p:sldId id="262" r:id="rId9"/>
-    <p:sldId id="263" r:id="rId10"/>
-    <p:sldId id="264" r:id="rId11"/>
-    <p:sldId id="266" r:id="rId12"/>
+    <p:sldId id="258" r:id="rId3"/>
+    <p:sldId id="259" r:id="rId4"/>
+    <p:sldId id="260" r:id="rId5"/>
+    <p:sldId id="261" r:id="rId6"/>
+    <p:sldId id="265" r:id="rId7"/>
+    <p:sldId id="262" r:id="rId8"/>
+    <p:sldId id="263" r:id="rId9"/>
+    <p:sldId id="264" r:id="rId10"/>
+    <p:sldId id="266" r:id="rId11"/>
   </p:sldIdLst>
   <p:sldSz cx="12192000" cy="6858000"/>
   <p:notesSz cx="6858000" cy="9144000"/>
@@ -768,7 +767,7 @@
           <a:p>
             <a:fld id="{762CEC22-7E63-4875-B7E5-EFE6F76FF188}" type="datetimeFigureOut">
               <a:rPr lang="es-ES" smtClean="0"/>
-              <a:t>22/01/2020</a:t>
+              <a:t>24/01/2020</a:t>
             </a:fld>
             <a:endParaRPr lang="es-ES"/>
           </a:p>
@@ -1888,7 +1887,7 @@
           <a:p>
             <a:fld id="{762CEC22-7E63-4875-B7E5-EFE6F76FF188}" type="datetimeFigureOut">
               <a:rPr lang="es-ES" smtClean="0"/>
-              <a:t>22/01/2020</a:t>
+              <a:t>24/01/2020</a:t>
             </a:fld>
             <a:endParaRPr lang="es-ES"/>
           </a:p>
@@ -2899,7 +2898,7 @@
           <a:p>
             <a:fld id="{762CEC22-7E63-4875-B7E5-EFE6F76FF188}" type="datetimeFigureOut">
               <a:rPr lang="es-ES" smtClean="0"/>
-              <a:t>22/01/2020</a:t>
+              <a:t>24/01/2020</a:t>
             </a:fld>
             <a:endParaRPr lang="es-ES"/>
           </a:p>
@@ -4069,7 +4068,7 @@
           <a:p>
             <a:fld id="{762CEC22-7E63-4875-B7E5-EFE6F76FF188}" type="datetimeFigureOut">
               <a:rPr lang="es-ES" smtClean="0"/>
-              <a:t>22/01/2020</a:t>
+              <a:t>24/01/2020</a:t>
             </a:fld>
             <a:endParaRPr lang="es-ES"/>
           </a:p>
@@ -5130,7 +5129,7 @@
           <a:p>
             <a:fld id="{762CEC22-7E63-4875-B7E5-EFE6F76FF188}" type="datetimeFigureOut">
               <a:rPr lang="es-ES" smtClean="0"/>
-              <a:t>22/01/2020</a:t>
+              <a:t>24/01/2020</a:t>
             </a:fld>
             <a:endParaRPr lang="es-ES"/>
           </a:p>
@@ -5776,7 +5775,7 @@
           <a:p>
             <a:fld id="{762CEC22-7E63-4875-B7E5-EFE6F76FF188}" type="datetimeFigureOut">
               <a:rPr lang="es-ES" smtClean="0"/>
-              <a:t>22/01/2020</a:t>
+              <a:t>24/01/2020</a:t>
             </a:fld>
             <a:endParaRPr lang="es-ES"/>
           </a:p>
@@ -6623,7 +6622,7 @@
           <a:p>
             <a:fld id="{762CEC22-7E63-4875-B7E5-EFE6F76FF188}" type="datetimeFigureOut">
               <a:rPr lang="es-ES" smtClean="0"/>
-              <a:t>22/01/2020</a:t>
+              <a:t>24/01/2020</a:t>
             </a:fld>
             <a:endParaRPr lang="es-ES"/>
           </a:p>
@@ -6798,7 +6797,7 @@
           <a:p>
             <a:fld id="{762CEC22-7E63-4875-B7E5-EFE6F76FF188}" type="datetimeFigureOut">
               <a:rPr lang="es-ES" smtClean="0"/>
-              <a:t>22/01/2020</a:t>
+              <a:t>24/01/2020</a:t>
             </a:fld>
             <a:endParaRPr lang="es-ES"/>
           </a:p>
@@ -7796,7 +7795,7 @@
           <a:p>
             <a:fld id="{762CEC22-7E63-4875-B7E5-EFE6F76FF188}" type="datetimeFigureOut">
               <a:rPr lang="es-ES" smtClean="0"/>
-              <a:t>22/01/2020</a:t>
+              <a:t>24/01/2020</a:t>
             </a:fld>
             <a:endParaRPr lang="es-ES"/>
           </a:p>
@@ -8002,7 +8001,7 @@
           <a:p>
             <a:fld id="{762CEC22-7E63-4875-B7E5-EFE6F76FF188}" type="datetimeFigureOut">
               <a:rPr lang="es-ES" smtClean="0"/>
-              <a:t>22/01/2020</a:t>
+              <a:t>24/01/2020</a:t>
             </a:fld>
             <a:endParaRPr lang="es-ES"/>
           </a:p>
@@ -9064,7 +9063,7 @@
           <a:p>
             <a:fld id="{762CEC22-7E63-4875-B7E5-EFE6F76FF188}" type="datetimeFigureOut">
               <a:rPr lang="es-ES" smtClean="0"/>
-              <a:t>22/01/2020</a:t>
+              <a:t>24/01/2020</a:t>
             </a:fld>
             <a:endParaRPr lang="es-ES"/>
           </a:p>
@@ -9336,7 +9335,7 @@
           <a:p>
             <a:fld id="{762CEC22-7E63-4875-B7E5-EFE6F76FF188}" type="datetimeFigureOut">
               <a:rPr lang="es-ES" smtClean="0"/>
-              <a:t>22/01/2020</a:t>
+              <a:t>24/01/2020</a:t>
             </a:fld>
             <a:endParaRPr lang="es-ES"/>
           </a:p>
@@ -9718,7 +9717,7 @@
           <a:p>
             <a:fld id="{762CEC22-7E63-4875-B7E5-EFE6F76FF188}" type="datetimeFigureOut">
               <a:rPr lang="es-ES" smtClean="0"/>
-              <a:t>22/01/2020</a:t>
+              <a:t>24/01/2020</a:t>
             </a:fld>
             <a:endParaRPr lang="es-ES"/>
           </a:p>
@@ -9836,7 +9835,7 @@
           <a:p>
             <a:fld id="{762CEC22-7E63-4875-B7E5-EFE6F76FF188}" type="datetimeFigureOut">
               <a:rPr lang="es-ES" smtClean="0"/>
-              <a:t>22/01/2020</a:t>
+              <a:t>24/01/2020</a:t>
             </a:fld>
             <a:endParaRPr lang="es-ES"/>
           </a:p>
@@ -9931,7 +9930,7 @@
           <a:p>
             <a:fld id="{762CEC22-7E63-4875-B7E5-EFE6F76FF188}" type="datetimeFigureOut">
               <a:rPr lang="es-ES" smtClean="0"/>
-              <a:t>22/01/2020</a:t>
+              <a:t>24/01/2020</a:t>
             </a:fld>
             <a:endParaRPr lang="es-ES"/>
           </a:p>
@@ -11040,7 +11039,7 @@
           <a:p>
             <a:fld id="{762CEC22-7E63-4875-B7E5-EFE6F76FF188}" type="datetimeFigureOut">
               <a:rPr lang="es-ES" smtClean="0"/>
-              <a:t>22/01/2020</a:t>
+              <a:t>24/01/2020</a:t>
             </a:fld>
             <a:endParaRPr lang="es-ES"/>
           </a:p>
@@ -12173,7 +12172,7 @@
           <a:p>
             <a:fld id="{762CEC22-7E63-4875-B7E5-EFE6F76FF188}" type="datetimeFigureOut">
               <a:rPr lang="es-ES" smtClean="0"/>
-              <a:t>22/01/2020</a:t>
+              <a:t>24/01/2020</a:t>
             </a:fld>
             <a:endParaRPr lang="es-ES"/>
           </a:p>
@@ -13201,7 +13200,7 @@
           <a:p>
             <a:fld id="{762CEC22-7E63-4875-B7E5-EFE6F76FF188}" type="datetimeFigureOut">
               <a:rPr lang="es-ES" smtClean="0"/>
-              <a:t>22/01/2020</a:t>
+              <a:t>24/01/2020</a:t>
             </a:fld>
             <a:endParaRPr lang="es-ES"/>
           </a:p>
@@ -13883,291 +13882,7 @@
             <a:pPr algn="ctr"/>
             <a:r>
               <a:rPr lang="es-ES" dirty="0" err="1" smtClean="0"/>
-              <a:t>Logoa</a:t>
-            </a:r>
-            <a:endParaRPr lang="es-ES" dirty="0"/>
-          </a:p>
-        </p:txBody>
-      </p:sp>
-      <p:pic>
-        <p:nvPicPr>
-          <p:cNvPr id="4" name="Irudia 3"/>
-          <p:cNvPicPr>
-            <a:picLocks noChangeAspect="1"/>
-          </p:cNvPicPr>
-          <p:nvPr/>
-        </p:nvPicPr>
-        <p:blipFill>
-          <a:blip r:embed="rId2">
-            <a:extLst>
-              <a:ext uri="{28A0092B-C50C-407E-A947-70E740481C1C}">
-                <a14:useLocalDpi xmlns:a14="http://schemas.microsoft.com/office/drawing/2010/main" val="0"/>
-              </a:ext>
-            </a:extLst>
-          </a:blip>
-          <a:stretch>
-            <a:fillRect/>
-          </a:stretch>
-        </p:blipFill>
-        <p:spPr>
-          <a:xfrm>
-            <a:off x="2915390" y="4498889"/>
-            <a:ext cx="1573484" cy="2001908"/>
-          </a:xfrm>
-          <a:prstGeom prst="rect">
-            <a:avLst/>
-          </a:prstGeom>
-        </p:spPr>
-      </p:pic>
-      <p:pic>
-        <p:nvPicPr>
-          <p:cNvPr id="5" name="Irudia 4"/>
-          <p:cNvPicPr>
-            <a:picLocks noChangeAspect="1"/>
-          </p:cNvPicPr>
-          <p:nvPr/>
-        </p:nvPicPr>
-        <p:blipFill>
-          <a:blip r:embed="rId3">
-            <a:extLst>
-              <a:ext uri="{28A0092B-C50C-407E-A947-70E740481C1C}">
-                <a14:useLocalDpi xmlns:a14="http://schemas.microsoft.com/office/drawing/2010/main" val="0"/>
-              </a:ext>
-            </a:extLst>
-          </a:blip>
-          <a:stretch>
-            <a:fillRect/>
-          </a:stretch>
-        </p:blipFill>
-        <p:spPr>
-          <a:xfrm>
-            <a:off x="2915390" y="2323746"/>
-            <a:ext cx="1481678" cy="1818129"/>
-          </a:xfrm>
-          <a:prstGeom prst="rect">
-            <a:avLst/>
-          </a:prstGeom>
-        </p:spPr>
-      </p:pic>
-      <p:sp>
-        <p:nvSpPr>
-          <p:cNvPr id="9" name="TestuKoadroa 8"/>
-          <p:cNvSpPr txBox="1"/>
-          <p:nvPr/>
-        </p:nvSpPr>
-        <p:spPr>
-          <a:xfrm>
-            <a:off x="6761017" y="2909644"/>
-            <a:ext cx="4100946" cy="646331"/>
-          </a:xfrm>
-          <a:prstGeom prst="rect">
-            <a:avLst/>
-          </a:prstGeom>
-          <a:noFill/>
-        </p:spPr>
-        <p:txBody>
-          <a:bodyPr wrap="square" rtlCol="0">
-            <a:spAutoFit/>
-          </a:bodyPr>
-          <a:lstStyle/>
-          <a:p>
-            <a:r>
-              <a:rPr lang="es-ES" dirty="0" err="1" smtClean="0"/>
-              <a:t>Hasieran</a:t>
-            </a:r>
-            <a:r>
-              <a:rPr lang="es-ES" dirty="0" smtClean="0"/>
-              <a:t> </a:t>
-            </a:r>
-            <a:r>
-              <a:rPr lang="es-ES" dirty="0" err="1" smtClean="0"/>
-              <a:t>honako</a:t>
-            </a:r>
-            <a:r>
-              <a:rPr lang="es-ES" dirty="0" smtClean="0"/>
-              <a:t> logo </a:t>
-            </a:r>
-            <a:r>
-              <a:rPr lang="es-ES" dirty="0" err="1" smtClean="0"/>
-              <a:t>hau</a:t>
-            </a:r>
-            <a:r>
-              <a:rPr lang="es-ES" dirty="0" smtClean="0"/>
-              <a:t> </a:t>
-            </a:r>
-            <a:r>
-              <a:rPr lang="es-ES" dirty="0" err="1" smtClean="0"/>
-              <a:t>diseinatu</a:t>
-            </a:r>
-            <a:r>
-              <a:rPr lang="es-ES" dirty="0" smtClean="0"/>
-              <a:t> </a:t>
-            </a:r>
-            <a:r>
-              <a:rPr lang="es-ES" dirty="0" err="1" smtClean="0"/>
-              <a:t>genuen</a:t>
-            </a:r>
-            <a:r>
-              <a:rPr lang="es-ES" dirty="0"/>
-              <a:t>.</a:t>
-            </a:r>
-          </a:p>
-        </p:txBody>
-      </p:sp>
-      <p:sp>
-        <p:nvSpPr>
-          <p:cNvPr id="10" name="TestuKoadroa 9"/>
-          <p:cNvSpPr txBox="1"/>
-          <p:nvPr/>
-        </p:nvSpPr>
-        <p:spPr>
-          <a:xfrm>
-            <a:off x="6761017" y="5176677"/>
-            <a:ext cx="4100946" cy="923330"/>
-          </a:xfrm>
-          <a:prstGeom prst="rect">
-            <a:avLst/>
-          </a:prstGeom>
-          <a:noFill/>
-        </p:spPr>
-        <p:txBody>
-          <a:bodyPr wrap="square" rtlCol="0">
-            <a:spAutoFit/>
-          </a:bodyPr>
-          <a:lstStyle/>
-          <a:p>
-            <a:r>
-              <a:rPr lang="es-ES" dirty="0" err="1" smtClean="0"/>
-              <a:t>Aurreko</a:t>
-            </a:r>
-            <a:r>
-              <a:rPr lang="es-ES" dirty="0" smtClean="0"/>
-              <a:t> </a:t>
-            </a:r>
-            <a:r>
-              <a:rPr lang="es-ES" dirty="0" err="1" smtClean="0"/>
-              <a:t>logoa</a:t>
-            </a:r>
-            <a:r>
-              <a:rPr lang="es-ES" dirty="0" smtClean="0"/>
-              <a:t> oso </a:t>
-            </a:r>
-            <a:r>
-              <a:rPr lang="es-ES" dirty="0" err="1" smtClean="0"/>
-              <a:t>ondo</a:t>
-            </a:r>
-            <a:r>
-              <a:rPr lang="es-ES" dirty="0" smtClean="0"/>
-              <a:t> </a:t>
-            </a:r>
-            <a:r>
-              <a:rPr lang="es-ES" dirty="0" err="1" smtClean="0"/>
-              <a:t>gelditzen</a:t>
-            </a:r>
-            <a:r>
-              <a:rPr lang="es-ES" dirty="0" smtClean="0"/>
-              <a:t> </a:t>
-            </a:r>
-            <a:r>
-              <a:rPr lang="es-ES" dirty="0" err="1" smtClean="0"/>
-              <a:t>ez</a:t>
-            </a:r>
-            <a:r>
-              <a:rPr lang="es-ES" dirty="0" smtClean="0"/>
-              <a:t> </a:t>
-            </a:r>
-            <a:r>
-              <a:rPr lang="es-ES" dirty="0" err="1" smtClean="0"/>
-              <a:t>zenez</a:t>
-            </a:r>
-            <a:r>
-              <a:rPr lang="es-ES" dirty="0" smtClean="0"/>
-              <a:t> logo </a:t>
-            </a:r>
-            <a:r>
-              <a:rPr lang="es-ES" dirty="0" err="1" smtClean="0"/>
-              <a:t>berria</a:t>
-            </a:r>
-            <a:r>
-              <a:rPr lang="es-ES" dirty="0" smtClean="0"/>
-              <a:t> </a:t>
-            </a:r>
-            <a:r>
-              <a:rPr lang="es-ES" dirty="0" err="1" smtClean="0"/>
-              <a:t>diseinatu</a:t>
-            </a:r>
-            <a:r>
-              <a:rPr lang="es-ES" dirty="0" smtClean="0"/>
-              <a:t> </a:t>
-            </a:r>
-            <a:r>
-              <a:rPr lang="es-ES" dirty="0" err="1" smtClean="0"/>
-              <a:t>genuen</a:t>
-            </a:r>
-            <a:r>
-              <a:rPr lang="es-ES" dirty="0" smtClean="0"/>
-              <a:t>.</a:t>
-            </a:r>
-            <a:endParaRPr lang="es-ES" dirty="0"/>
-          </a:p>
-        </p:txBody>
-      </p:sp>
-    </p:spTree>
-    <p:extLst>
-      <p:ext uri="{BB962C8B-B14F-4D97-AF65-F5344CB8AC3E}">
-        <p14:creationId xmlns:p14="http://schemas.microsoft.com/office/powerpoint/2010/main" val="2208554266"/>
-      </p:ext>
-    </p:extLst>
-  </p:cSld>
-  <p:clrMapOvr>
-    <a:masterClrMapping/>
-  </p:clrMapOvr>
-  <p:timing>
-    <p:tnLst>
-      <p:par>
-        <p:cTn id="1" dur="indefinite" restart="never" nodeType="tmRoot"/>
-      </p:par>
-    </p:tnLst>
-  </p:timing>
-</p:sld>
-</file>
-
-<file path=ppt/slides/slide11.xml><?xml version="1.0" encoding="utf-8"?>
-<p:sld xmlns:a="http://schemas.openxmlformats.org/drawingml/2006/main" xmlns:r="http://schemas.openxmlformats.org/officeDocument/2006/relationships" xmlns:p="http://schemas.openxmlformats.org/presentationml/2006/main">
-  <p:cSld>
-    <p:spTree>
-      <p:nvGrpSpPr>
-        <p:cNvPr id="1" name=""/>
-        <p:cNvGrpSpPr/>
-        <p:nvPr/>
-      </p:nvGrpSpPr>
-      <p:grpSpPr>
-        <a:xfrm>
-          <a:off x="0" y="0"/>
-          <a:ext cx="0" cy="0"/>
-          <a:chOff x="0" y="0"/>
-          <a:chExt cx="0" cy="0"/>
-        </a:xfrm>
-      </p:grpSpPr>
-      <p:sp>
-        <p:nvSpPr>
-          <p:cNvPr id="2" name="Titulua 1"/>
-          <p:cNvSpPr>
-            <a:spLocks noGrp="1"/>
-          </p:cNvSpPr>
-          <p:nvPr>
-            <p:ph type="title"/>
-          </p:nvPr>
-        </p:nvSpPr>
-        <p:spPr/>
-        <p:txBody>
-          <a:bodyPr/>
-          <a:lstStyle/>
-          <a:p>
-            <a:pPr algn="ctr"/>
-            <a:r>
-              <a:rPr lang="es-ES" dirty="0" err="1" smtClean="0"/>
-              <a:t>Gohiburuko</a:t>
+              <a:t>Goiburuko</a:t>
             </a:r>
             <a:r>
               <a:rPr lang="es-ES" dirty="0" smtClean="0"/>
@@ -14512,218 +14227,6 @@
             <a:pPr algn="ctr"/>
             <a:r>
               <a:rPr lang="es-ES" dirty="0" err="1" smtClean="0"/>
-              <a:t>Hasierako</a:t>
-            </a:r>
-            <a:r>
-              <a:rPr lang="es-ES" dirty="0" smtClean="0"/>
-              <a:t> </a:t>
-            </a:r>
-            <a:r>
-              <a:rPr lang="es-ES" dirty="0" err="1" smtClean="0"/>
-              <a:t>Bozetoa</a:t>
-            </a:r>
-            <a:endParaRPr lang="es-ES" dirty="0"/>
-          </a:p>
-        </p:txBody>
-      </p:sp>
-      <p:pic>
-        <p:nvPicPr>
-          <p:cNvPr id="6" name="Edukiaren leku-marka 5"/>
-          <p:cNvPicPr>
-            <a:picLocks noGrp="1" noChangeAspect="1"/>
-          </p:cNvPicPr>
-          <p:nvPr>
-            <p:ph idx="1"/>
-          </p:nvPr>
-        </p:nvPicPr>
-        <p:blipFill>
-          <a:blip r:embed="rId2" cstate="print">
-            <a:extLst>
-              <a:ext uri="{28A0092B-C50C-407E-A947-70E740481C1C}">
-                <a14:useLocalDpi xmlns:a14="http://schemas.microsoft.com/office/drawing/2010/main" val="0"/>
-              </a:ext>
-            </a:extLst>
-          </a:blip>
-          <a:stretch>
-            <a:fillRect/>
-          </a:stretch>
-        </p:blipFill>
-        <p:spPr>
-          <a:xfrm rot="16200000">
-            <a:off x="2813347" y="794186"/>
-            <a:ext cx="4264439" cy="7581227"/>
-          </a:xfrm>
-        </p:spPr>
-      </p:pic>
-      <p:sp>
-        <p:nvSpPr>
-          <p:cNvPr id="8" name="TestuKoadroa 7"/>
-          <p:cNvSpPr txBox="1"/>
-          <p:nvPr/>
-        </p:nvSpPr>
-        <p:spPr>
-          <a:xfrm>
-            <a:off x="9421091" y="3713018"/>
-            <a:ext cx="2618509" cy="1754326"/>
-          </a:xfrm>
-          <a:prstGeom prst="rect">
-            <a:avLst/>
-          </a:prstGeom>
-          <a:noFill/>
-        </p:spPr>
-        <p:txBody>
-          <a:bodyPr wrap="square" rtlCol="0">
-            <a:spAutoFit/>
-          </a:bodyPr>
-          <a:lstStyle/>
-          <a:p>
-            <a:r>
-              <a:rPr lang="es-ES" dirty="0" err="1" smtClean="0"/>
-              <a:t>Hasieran</a:t>
-            </a:r>
-            <a:r>
-              <a:rPr lang="es-ES" dirty="0" smtClean="0"/>
-              <a:t> </a:t>
-            </a:r>
-            <a:r>
-              <a:rPr lang="es-ES" dirty="0" err="1" smtClean="0"/>
-              <a:t>geneukagun</a:t>
-            </a:r>
-            <a:r>
-              <a:rPr lang="es-ES" dirty="0" smtClean="0"/>
-              <a:t> </a:t>
-            </a:r>
-            <a:r>
-              <a:rPr lang="es-ES" dirty="0" err="1" smtClean="0"/>
-              <a:t>ideiaren</a:t>
-            </a:r>
-            <a:r>
-              <a:rPr lang="es-ES" dirty="0" smtClean="0"/>
-              <a:t> </a:t>
-            </a:r>
-            <a:r>
-              <a:rPr lang="es-ES" dirty="0" err="1" smtClean="0"/>
-              <a:t>maketazioa</a:t>
-            </a:r>
-            <a:r>
-              <a:rPr lang="es-ES" dirty="0" smtClean="0"/>
-              <a:t> </a:t>
-            </a:r>
-            <a:r>
-              <a:rPr lang="es-ES" dirty="0" err="1" smtClean="0"/>
-              <a:t>egin</a:t>
-            </a:r>
-            <a:r>
-              <a:rPr lang="es-ES" dirty="0" smtClean="0"/>
-              <a:t> </a:t>
-            </a:r>
-            <a:r>
-              <a:rPr lang="es-ES" dirty="0" err="1" smtClean="0"/>
-              <a:t>genuen</a:t>
-            </a:r>
-            <a:r>
-              <a:rPr lang="es-ES" dirty="0" smtClean="0"/>
-              <a:t> </a:t>
-            </a:r>
-            <a:r>
-              <a:rPr lang="es-ES" dirty="0" err="1" smtClean="0"/>
-              <a:t>gutxi</a:t>
-            </a:r>
-            <a:r>
-              <a:rPr lang="es-ES" dirty="0" smtClean="0"/>
-              <a:t> </a:t>
-            </a:r>
-            <a:r>
-              <a:rPr lang="es-ES" dirty="0" err="1" smtClean="0"/>
-              <a:t>gora</a:t>
-            </a:r>
-            <a:r>
-              <a:rPr lang="es-ES" dirty="0" smtClean="0"/>
-              <a:t> </a:t>
-            </a:r>
-            <a:r>
-              <a:rPr lang="es-ES" dirty="0" err="1" smtClean="0"/>
-              <a:t>nolakoa</a:t>
-            </a:r>
-            <a:r>
-              <a:rPr lang="es-ES" dirty="0" smtClean="0"/>
-              <a:t> </a:t>
-            </a:r>
-            <a:r>
-              <a:rPr lang="es-ES" dirty="0" err="1" smtClean="0"/>
-              <a:t>izango</a:t>
-            </a:r>
-            <a:r>
-              <a:rPr lang="es-ES" dirty="0" smtClean="0"/>
-              <a:t> zen </a:t>
-            </a:r>
-            <a:r>
-              <a:rPr lang="es-ES" dirty="0" err="1" smtClean="0"/>
-              <a:t>jakiteko</a:t>
-            </a:r>
-            <a:r>
-              <a:rPr lang="es-ES" dirty="0" smtClean="0"/>
-              <a:t>.</a:t>
-            </a:r>
-            <a:endParaRPr lang="es-ES" dirty="0"/>
-          </a:p>
-        </p:txBody>
-      </p:sp>
-    </p:spTree>
-    <p:extLst>
-      <p:ext uri="{BB962C8B-B14F-4D97-AF65-F5344CB8AC3E}">
-        <p14:creationId xmlns:p14="http://schemas.microsoft.com/office/powerpoint/2010/main" val="4128808435"/>
-      </p:ext>
-    </p:extLst>
-  </p:cSld>
-  <p:clrMapOvr>
-    <a:masterClrMapping/>
-  </p:clrMapOvr>
-  <p:timing>
-    <p:tnLst>
-      <p:par>
-        <p:cTn id="1" dur="indefinite" restart="never" nodeType="tmRoot"/>
-      </p:par>
-    </p:tnLst>
-  </p:timing>
-</p:sld>
-</file>
-
-<file path=ppt/slides/slide3.xml><?xml version="1.0" encoding="utf-8"?>
-<p:sld xmlns:a="http://schemas.openxmlformats.org/drawingml/2006/main" xmlns:r="http://schemas.openxmlformats.org/officeDocument/2006/relationships" xmlns:p="http://schemas.openxmlformats.org/presentationml/2006/main">
-  <p:cSld>
-    <p:spTree>
-      <p:nvGrpSpPr>
-        <p:cNvPr id="1" name=""/>
-        <p:cNvGrpSpPr/>
-        <p:nvPr/>
-      </p:nvGrpSpPr>
-      <p:grpSpPr>
-        <a:xfrm>
-          <a:off x="0" y="0"/>
-          <a:ext cx="0" cy="0"/>
-          <a:chOff x="0" y="0"/>
-          <a:chExt cx="0" cy="0"/>
-        </a:xfrm>
-      </p:grpSpPr>
-      <p:sp>
-        <p:nvSpPr>
-          <p:cNvPr id="2" name="Titulua 1"/>
-          <p:cNvSpPr>
-            <a:spLocks noGrp="1"/>
-          </p:cNvSpPr>
-          <p:nvPr>
-            <p:ph type="title"/>
-          </p:nvPr>
-        </p:nvSpPr>
-        <p:spPr/>
-        <p:txBody>
-          <a:bodyPr/>
-          <a:lstStyle/>
-          <a:p>
-            <a:pPr algn="ctr"/>
-            <a:r>
-              <a:rPr lang="es-ES" dirty="0" err="1" smtClean="0"/>
               <a:t>Maketazioa</a:t>
             </a:r>
             <a:endParaRPr lang="es-ES" dirty="0"/>
@@ -14964,7 +14467,7 @@
 </p:sld>
 </file>
 
-<file path=ppt/slides/slide4.xml><?xml version="1.0" encoding="utf-8"?>
+<file path=ppt/slides/slide3.xml><?xml version="1.0" encoding="utf-8"?>
 <p:sld xmlns:a="http://schemas.openxmlformats.org/drawingml/2006/main" xmlns:r="http://schemas.openxmlformats.org/officeDocument/2006/relationships" xmlns:p="http://schemas.openxmlformats.org/presentationml/2006/main">
   <p:cSld>
     <p:spTree>
@@ -15195,7 +14698,7 @@
 </p:sld>
 </file>
 
-<file path=ppt/slides/slide5.xml><?xml version="1.0" encoding="utf-8"?>
+<file path=ppt/slides/slide4.xml><?xml version="1.0" encoding="utf-8"?>
 <p:sld xmlns:a="http://schemas.openxmlformats.org/drawingml/2006/main" xmlns:r="http://schemas.openxmlformats.org/officeDocument/2006/relationships" xmlns:p="http://schemas.openxmlformats.org/presentationml/2006/main">
   <p:cSld>
     <p:spTree>
@@ -15428,7 +14931,7 @@
 </p:sld>
 </file>
 
-<file path=ppt/slides/slide6.xml><?xml version="1.0" encoding="utf-8"?>
+<file path=ppt/slides/slide5.xml><?xml version="1.0" encoding="utf-8"?>
 <p:sld xmlns:a="http://schemas.openxmlformats.org/drawingml/2006/main" xmlns:r="http://schemas.openxmlformats.org/officeDocument/2006/relationships" xmlns:p="http://schemas.openxmlformats.org/presentationml/2006/main">
   <p:cSld>
     <p:spTree>
@@ -15647,7 +15150,7 @@
 </p:sld>
 </file>
 
-<file path=ppt/slides/slide7.xml><?xml version="1.0" encoding="utf-8"?>
+<file path=ppt/slides/slide6.xml><?xml version="1.0" encoding="utf-8"?>
 <p:sld xmlns:a="http://schemas.openxmlformats.org/drawingml/2006/main" xmlns:r="http://schemas.openxmlformats.org/officeDocument/2006/relationships" xmlns:p="http://schemas.openxmlformats.org/presentationml/2006/main">
   <p:cSld>
     <p:spTree>
@@ -16040,7 +15543,7 @@
 </p:sld>
 </file>
 
-<file path=ppt/slides/slide8.xml><?xml version="1.0" encoding="utf-8"?>
+<file path=ppt/slides/slide7.xml><?xml version="1.0" encoding="utf-8"?>
 <p:sld xmlns:a="http://schemas.openxmlformats.org/drawingml/2006/main" xmlns:r="http://schemas.openxmlformats.org/officeDocument/2006/relationships" xmlns:p="http://schemas.openxmlformats.org/presentationml/2006/main">
   <p:cSld>
     <p:spTree>
@@ -16276,7 +15779,7 @@
 </p:sld>
 </file>
 
-<file path=ppt/slides/slide9.xml><?xml version="1.0" encoding="utf-8"?>
+<file path=ppt/slides/slide8.xml><?xml version="1.0" encoding="utf-8"?>
 <p:sld xmlns:a="http://schemas.openxmlformats.org/drawingml/2006/main" xmlns:r="http://schemas.openxmlformats.org/officeDocument/2006/relationships" xmlns:p="http://schemas.openxmlformats.org/presentationml/2006/main">
   <p:cSld>
     <p:spTree>
@@ -16502,6 +16005,290 @@
     <p:extLst>
       <p:ext uri="{BB962C8B-B14F-4D97-AF65-F5344CB8AC3E}">
         <p14:creationId xmlns:p14="http://schemas.microsoft.com/office/powerpoint/2010/main" val="1451992564"/>
+      </p:ext>
+    </p:extLst>
+  </p:cSld>
+  <p:clrMapOvr>
+    <a:masterClrMapping/>
+  </p:clrMapOvr>
+  <p:timing>
+    <p:tnLst>
+      <p:par>
+        <p:cTn id="1" dur="indefinite" restart="never" nodeType="tmRoot"/>
+      </p:par>
+    </p:tnLst>
+  </p:timing>
+</p:sld>
+</file>
+
+<file path=ppt/slides/slide9.xml><?xml version="1.0" encoding="utf-8"?>
+<p:sld xmlns:a="http://schemas.openxmlformats.org/drawingml/2006/main" xmlns:r="http://schemas.openxmlformats.org/officeDocument/2006/relationships" xmlns:p="http://schemas.openxmlformats.org/presentationml/2006/main">
+  <p:cSld>
+    <p:spTree>
+      <p:nvGrpSpPr>
+        <p:cNvPr id="1" name=""/>
+        <p:cNvGrpSpPr/>
+        <p:nvPr/>
+      </p:nvGrpSpPr>
+      <p:grpSpPr>
+        <a:xfrm>
+          <a:off x="0" y="0"/>
+          <a:ext cx="0" cy="0"/>
+          <a:chOff x="0" y="0"/>
+          <a:chExt cx="0" cy="0"/>
+        </a:xfrm>
+      </p:grpSpPr>
+      <p:sp>
+        <p:nvSpPr>
+          <p:cNvPr id="2" name="Titulua 1"/>
+          <p:cNvSpPr>
+            <a:spLocks noGrp="1"/>
+          </p:cNvSpPr>
+          <p:nvPr>
+            <p:ph type="title"/>
+          </p:nvPr>
+        </p:nvSpPr>
+        <p:spPr/>
+        <p:txBody>
+          <a:bodyPr/>
+          <a:lstStyle/>
+          <a:p>
+            <a:pPr algn="ctr"/>
+            <a:r>
+              <a:rPr lang="es-ES" dirty="0" err="1" smtClean="0"/>
+              <a:t>Logoa</a:t>
+            </a:r>
+            <a:endParaRPr lang="es-ES" dirty="0"/>
+          </a:p>
+        </p:txBody>
+      </p:sp>
+      <p:pic>
+        <p:nvPicPr>
+          <p:cNvPr id="4" name="Irudia 3"/>
+          <p:cNvPicPr>
+            <a:picLocks noChangeAspect="1"/>
+          </p:cNvPicPr>
+          <p:nvPr/>
+        </p:nvPicPr>
+        <p:blipFill>
+          <a:blip r:embed="rId2">
+            <a:extLst>
+              <a:ext uri="{28A0092B-C50C-407E-A947-70E740481C1C}">
+                <a14:useLocalDpi xmlns:a14="http://schemas.microsoft.com/office/drawing/2010/main" val="0"/>
+              </a:ext>
+            </a:extLst>
+          </a:blip>
+          <a:stretch>
+            <a:fillRect/>
+          </a:stretch>
+        </p:blipFill>
+        <p:spPr>
+          <a:xfrm>
+            <a:off x="2915390" y="4498889"/>
+            <a:ext cx="1573484" cy="2001908"/>
+          </a:xfrm>
+          <a:prstGeom prst="rect">
+            <a:avLst/>
+          </a:prstGeom>
+        </p:spPr>
+      </p:pic>
+      <p:pic>
+        <p:nvPicPr>
+          <p:cNvPr id="5" name="Irudia 4"/>
+          <p:cNvPicPr>
+            <a:picLocks noChangeAspect="1"/>
+          </p:cNvPicPr>
+          <p:nvPr/>
+        </p:nvPicPr>
+        <p:blipFill>
+          <a:blip r:embed="rId3">
+            <a:extLst>
+              <a:ext uri="{28A0092B-C50C-407E-A947-70E740481C1C}">
+                <a14:useLocalDpi xmlns:a14="http://schemas.microsoft.com/office/drawing/2010/main" val="0"/>
+              </a:ext>
+            </a:extLst>
+          </a:blip>
+          <a:stretch>
+            <a:fillRect/>
+          </a:stretch>
+        </p:blipFill>
+        <p:spPr>
+          <a:xfrm>
+            <a:off x="2915390" y="2323746"/>
+            <a:ext cx="1481678" cy="1818129"/>
+          </a:xfrm>
+          <a:prstGeom prst="rect">
+            <a:avLst/>
+          </a:prstGeom>
+        </p:spPr>
+      </p:pic>
+      <p:sp>
+        <p:nvSpPr>
+          <p:cNvPr id="9" name="TestuKoadroa 8"/>
+          <p:cNvSpPr txBox="1"/>
+          <p:nvPr/>
+        </p:nvSpPr>
+        <p:spPr>
+          <a:xfrm>
+            <a:off x="6761017" y="2909644"/>
+            <a:ext cx="4100946" cy="646331"/>
+          </a:xfrm>
+          <a:prstGeom prst="rect">
+            <a:avLst/>
+          </a:prstGeom>
+          <a:noFill/>
+        </p:spPr>
+        <p:txBody>
+          <a:bodyPr wrap="square" rtlCol="0">
+            <a:spAutoFit/>
+          </a:bodyPr>
+          <a:lstStyle/>
+          <a:p>
+            <a:r>
+              <a:rPr lang="es-ES" dirty="0" err="1" smtClean="0"/>
+              <a:t>Hasieran</a:t>
+            </a:r>
+            <a:r>
+              <a:rPr lang="es-ES" dirty="0" smtClean="0"/>
+              <a:t> </a:t>
+            </a:r>
+            <a:r>
+              <a:rPr lang="es-ES" dirty="0" err="1" smtClean="0"/>
+              <a:t>honako</a:t>
+            </a:r>
+            <a:r>
+              <a:rPr lang="es-ES" dirty="0" smtClean="0"/>
+              <a:t> logo </a:t>
+            </a:r>
+            <a:r>
+              <a:rPr lang="es-ES" dirty="0" err="1" smtClean="0"/>
+              <a:t>hau</a:t>
+            </a:r>
+            <a:r>
+              <a:rPr lang="es-ES" dirty="0" smtClean="0"/>
+              <a:t> </a:t>
+            </a:r>
+            <a:r>
+              <a:rPr lang="es-ES" dirty="0" err="1" smtClean="0"/>
+              <a:t>diseinatu</a:t>
+            </a:r>
+            <a:r>
+              <a:rPr lang="es-ES" dirty="0" smtClean="0"/>
+              <a:t> </a:t>
+            </a:r>
+            <a:r>
+              <a:rPr lang="es-ES" dirty="0" err="1" smtClean="0"/>
+              <a:t>genuen</a:t>
+            </a:r>
+            <a:r>
+              <a:rPr lang="es-ES" dirty="0"/>
+              <a:t>.</a:t>
+            </a:r>
+          </a:p>
+        </p:txBody>
+      </p:sp>
+      <p:sp>
+        <p:nvSpPr>
+          <p:cNvPr id="10" name="TestuKoadroa 9"/>
+          <p:cNvSpPr txBox="1"/>
+          <p:nvPr/>
+        </p:nvSpPr>
+        <p:spPr>
+          <a:xfrm>
+            <a:off x="6761017" y="5176677"/>
+            <a:ext cx="4100946" cy="923330"/>
+          </a:xfrm>
+          <a:prstGeom prst="rect">
+            <a:avLst/>
+          </a:prstGeom>
+          <a:noFill/>
+        </p:spPr>
+        <p:txBody>
+          <a:bodyPr wrap="square" rtlCol="0">
+            <a:spAutoFit/>
+          </a:bodyPr>
+          <a:lstStyle/>
+          <a:p>
+            <a:r>
+              <a:rPr lang="es-ES" dirty="0" err="1" smtClean="0"/>
+              <a:t>Aurreko</a:t>
+            </a:r>
+            <a:r>
+              <a:rPr lang="es-ES" dirty="0" smtClean="0"/>
+              <a:t> </a:t>
+            </a:r>
+            <a:r>
+              <a:rPr lang="es-ES" dirty="0" err="1" smtClean="0"/>
+              <a:t>logoa</a:t>
+            </a:r>
+            <a:r>
+              <a:rPr lang="es-ES" dirty="0" smtClean="0"/>
+              <a:t> oso </a:t>
+            </a:r>
+            <a:r>
+              <a:rPr lang="es-ES" dirty="0" err="1" smtClean="0"/>
+              <a:t>ondo</a:t>
+            </a:r>
+            <a:r>
+              <a:rPr lang="es-ES" dirty="0" smtClean="0"/>
+              <a:t> </a:t>
+            </a:r>
+            <a:r>
+              <a:rPr lang="es-ES" dirty="0" err="1" smtClean="0"/>
+              <a:t>gelditzen</a:t>
+            </a:r>
+            <a:r>
+              <a:rPr lang="es-ES" dirty="0" smtClean="0"/>
+              <a:t> </a:t>
+            </a:r>
+            <a:r>
+              <a:rPr lang="es-ES" dirty="0" err="1" smtClean="0"/>
+              <a:t>ez</a:t>
+            </a:r>
+            <a:r>
+              <a:rPr lang="es-ES" dirty="0" smtClean="0"/>
+              <a:t> </a:t>
+            </a:r>
+            <a:r>
+              <a:rPr lang="es-ES" dirty="0" err="1" smtClean="0"/>
+              <a:t>zenez</a:t>
+            </a:r>
+            <a:r>
+              <a:rPr lang="es-ES" dirty="0" smtClean="0"/>
+              <a:t> logo </a:t>
+            </a:r>
+            <a:r>
+              <a:rPr lang="es-ES" dirty="0" err="1" smtClean="0"/>
+              <a:t>berria</a:t>
+            </a:r>
+            <a:r>
+              <a:rPr lang="es-ES" dirty="0" smtClean="0"/>
+              <a:t> </a:t>
+            </a:r>
+            <a:r>
+              <a:rPr lang="es-ES" dirty="0" err="1" smtClean="0"/>
+              <a:t>diseinatu</a:t>
+            </a:r>
+            <a:r>
+              <a:rPr lang="es-ES" dirty="0" smtClean="0"/>
+              <a:t> </a:t>
+            </a:r>
+            <a:r>
+              <a:rPr lang="es-ES" dirty="0" err="1" smtClean="0"/>
+              <a:t>genuen</a:t>
+            </a:r>
+            <a:r>
+              <a:rPr lang="es-ES" dirty="0" smtClean="0"/>
+              <a:t>.</a:t>
+            </a:r>
+            <a:endParaRPr lang="es-ES" dirty="0"/>
+          </a:p>
+        </p:txBody>
+      </p:sp>
+    </p:spTree>
+    <p:extLst>
+      <p:ext uri="{BB962C8B-B14F-4D97-AF65-F5344CB8AC3E}">
+        <p14:creationId xmlns:p14="http://schemas.microsoft.com/office/powerpoint/2010/main" val="2208554266"/>
       </p:ext>
     </p:extLst>
   </p:cSld>

</xml_diff>